<commit_message>
fix grouped shape issue
</commit_message>
<xml_diff>
--- a/test/ShapeCrawler.Tests.Unit/Resource/autoshape/autoshape-case003.pptx
+++ b/test/ShapeCrawler.Tests.Unit/Resource/autoshape/autoshape-case003.pptx
@@ -190,7 +190,7 @@
           <a:p>
             <a:fld id="{187A1D98-78C0-4636-B978-80F082D40D27}" type="datetimeFigureOut">
               <a:rPr lang="de-DE" smtClean="0"/>
-              <a:t>18.11.2022</a:t>
+              <a:t>27.04.2023</a:t>
             </a:fld>
             <a:endParaRPr lang="de-DE"/>
           </a:p>
@@ -448,7 +448,7 @@
           <a:p>
             <a:fld id="{187A1D98-78C0-4636-B978-80F082D40D27}" type="datetimeFigureOut">
               <a:rPr lang="de-DE" smtClean="0"/>
-              <a:t>18.11.2022</a:t>
+              <a:t>27.04.2023</a:t>
             </a:fld>
             <a:endParaRPr lang="de-DE"/>
           </a:p>
@@ -661,7 +661,7 @@
           <a:p>
             <a:fld id="{187A1D98-78C0-4636-B978-80F082D40D27}" type="datetimeFigureOut">
               <a:rPr lang="de-DE" smtClean="0"/>
-              <a:t>18.11.2022</a:t>
+              <a:t>27.04.2023</a:t>
             </a:fld>
             <a:endParaRPr lang="de-DE"/>
           </a:p>
@@ -869,7 +869,7 @@
           <a:p>
             <a:fld id="{187A1D98-78C0-4636-B978-80F082D40D27}" type="datetimeFigureOut">
               <a:rPr lang="de-DE" smtClean="0"/>
-              <a:t>18.11.2022</a:t>
+              <a:t>27.04.2023</a:t>
             </a:fld>
             <a:endParaRPr lang="de-DE"/>
           </a:p>
@@ -1148,7 +1148,7 @@
           <a:p>
             <a:fld id="{187A1D98-78C0-4636-B978-80F082D40D27}" type="datetimeFigureOut">
               <a:rPr lang="de-DE" smtClean="0"/>
-              <a:t>18.11.2022</a:t>
+              <a:t>27.04.2023</a:t>
             </a:fld>
             <a:endParaRPr lang="de-DE"/>
           </a:p>
@@ -1422,7 +1422,7 @@
           <a:p>
             <a:fld id="{187A1D98-78C0-4636-B978-80F082D40D27}" type="datetimeFigureOut">
               <a:rPr lang="de-DE" smtClean="0"/>
-              <a:t>18.11.2022</a:t>
+              <a:t>27.04.2023</a:t>
             </a:fld>
             <a:endParaRPr lang="de-DE"/>
           </a:p>
@@ -1849,7 +1849,7 @@
           <a:p>
             <a:fld id="{187A1D98-78C0-4636-B978-80F082D40D27}" type="datetimeFigureOut">
               <a:rPr lang="de-DE" smtClean="0"/>
-              <a:t>18.11.2022</a:t>
+              <a:t>27.04.2023</a:t>
             </a:fld>
             <a:endParaRPr lang="de-DE"/>
           </a:p>
@@ -1991,7 +1991,7 @@
           <a:p>
             <a:fld id="{187A1D98-78C0-4636-B978-80F082D40D27}" type="datetimeFigureOut">
               <a:rPr lang="de-DE" smtClean="0"/>
-              <a:t>18.11.2022</a:t>
+              <a:t>27.04.2023</a:t>
             </a:fld>
             <a:endParaRPr lang="de-DE"/>
           </a:p>
@@ -2104,7 +2104,7 @@
           <a:p>
             <a:fld id="{187A1D98-78C0-4636-B978-80F082D40D27}" type="datetimeFigureOut">
               <a:rPr lang="de-DE" smtClean="0"/>
-              <a:t>18.11.2022</a:t>
+              <a:t>27.04.2023</a:t>
             </a:fld>
             <a:endParaRPr lang="de-DE"/>
           </a:p>
@@ -2423,7 +2423,7 @@
           <a:p>
             <a:fld id="{187A1D98-78C0-4636-B978-80F082D40D27}" type="datetimeFigureOut">
               <a:rPr lang="de-DE" smtClean="0"/>
-              <a:t>18.11.2022</a:t>
+              <a:t>27.04.2023</a:t>
             </a:fld>
             <a:endParaRPr lang="de-DE"/>
           </a:p>
@@ -2718,7 +2718,7 @@
           <a:p>
             <a:fld id="{187A1D98-78C0-4636-B978-80F082D40D27}" type="datetimeFigureOut">
               <a:rPr lang="de-DE" smtClean="0"/>
-              <a:t>18.11.2022</a:t>
+              <a:t>27.04.2023</a:t>
             </a:fld>
             <a:endParaRPr lang="de-DE"/>
           </a:p>
@@ -2893,7 +2893,7 @@
           <a:p>
             <a:fld id="{187A1D98-78C0-4636-B978-80F082D40D27}" type="datetimeFigureOut">
               <a:rPr lang="de-DE" smtClean="0"/>
-              <a:t>18.11.2022</a:t>
+              <a:t>27.04.2023</a:t>
             </a:fld>
             <a:endParaRPr lang="de-DE"/>
           </a:p>
@@ -3801,6 +3801,96 @@
           </a:p>
         </p:txBody>
       </p:sp>
+      <p:grpSp>
+        <p:nvGrpSpPr>
+          <p:cNvPr id="9" name="Group 1">
+            <a:extLst>
+              <a:ext uri="{FF2B5EF4-FFF2-40B4-BE49-F238E27FC236}">
+                <a16:creationId xmlns:a16="http://schemas.microsoft.com/office/drawing/2014/main" id="{5B74528B-E0C2-77A8-6603-EBF39B3BE89B}"/>
+              </a:ext>
+            </a:extLst>
+          </p:cNvPr>
+          <p:cNvGrpSpPr/>
+          <p:nvPr/>
+        </p:nvGrpSpPr>
+        <p:grpSpPr>
+          <a:xfrm>
+            <a:off x="5878286" y="242990"/>
+            <a:ext cx="3476625" cy="2000250"/>
+            <a:chOff x="4346577" y="1937231"/>
+            <a:chExt cx="3476625" cy="2000250"/>
+          </a:xfrm>
+        </p:grpSpPr>
+        <p:pic>
+          <p:nvPicPr>
+            <p:cNvPr id="10" name="Shape 2">
+              <a:extLst>
+                <a:ext uri="{FF2B5EF4-FFF2-40B4-BE49-F238E27FC236}">
+                  <a16:creationId xmlns:a16="http://schemas.microsoft.com/office/drawing/2014/main" id="{63F146DA-2A2B-71CB-F750-483B3543B222}"/>
+                </a:ext>
+              </a:extLst>
+            </p:cNvPr>
+            <p:cNvPicPr>
+              <a:picLocks noChangeAspect="1"/>
+            </p:cNvPicPr>
+            <p:nvPr/>
+          </p:nvPicPr>
+          <p:blipFill>
+            <a:blip r:embed="rId2"/>
+            <a:stretch>
+              <a:fillRect/>
+            </a:stretch>
+          </p:blipFill>
+          <p:spPr>
+            <a:xfrm>
+              <a:off x="4346577" y="1937231"/>
+              <a:ext cx="3476625" cy="2000250"/>
+            </a:xfrm>
+            <a:prstGeom prst="rect">
+              <a:avLst/>
+            </a:prstGeom>
+          </p:spPr>
+        </p:pic>
+        <p:sp>
+          <p:nvSpPr>
+            <p:cNvPr id="11" name="Shape 1">
+              <a:extLst>
+                <a:ext uri="{FF2B5EF4-FFF2-40B4-BE49-F238E27FC236}">
+                  <a16:creationId xmlns:a16="http://schemas.microsoft.com/office/drawing/2014/main" id="{D042E879-2810-ED53-118A-018B81CA9942}"/>
+                </a:ext>
+              </a:extLst>
+            </p:cNvPr>
+            <p:cNvSpPr txBox="1"/>
+            <p:nvPr/>
+          </p:nvSpPr>
+          <p:spPr>
+            <a:xfrm>
+              <a:off x="5214379" y="3369718"/>
+              <a:ext cx="1882987" cy="307777"/>
+            </a:xfrm>
+            <a:prstGeom prst="rect">
+              <a:avLst/>
+            </a:prstGeom>
+            <a:noFill/>
+          </p:spPr>
+          <p:txBody>
+            <a:bodyPr wrap="square" rtlCol="0">
+              <a:spAutoFit/>
+            </a:bodyPr>
+            <a:lstStyle/>
+            <a:p>
+              <a:pPr algn="ctr"/>
+              <a:r>
+                <a:rPr lang="it-IT" sz="1400" dirty="0">
+                  <a:latin typeface="Segoe UI" panose="020B0502040204020203" pitchFamily="34" charset="0"/>
+                  <a:cs typeface="Segoe UI" panose="020B0502040204020203" pitchFamily="34" charset="0"/>
+                </a:rPr>
+                <a:t>Safety</a:t>
+              </a:r>
+            </a:p>
+          </p:txBody>
+        </p:sp>
+      </p:grpSp>
     </p:spTree>
     <p:extLst>
       <p:ext uri="{BB962C8B-B14F-4D97-AF65-F5344CB8AC3E}">

</xml_diff>